<commit_message>
update the index page.
</commit_message>
<xml_diff>
--- a/doc/designDoc.pptx
+++ b/doc/designDoc.pptx
@@ -104,6 +104,11 @@
       </a:defRPr>
     </a:lvl9pPr>
   </p:defaultTextStyle>
+  <p:extLst>
+    <p:ext uri="{EFAFB233-063F-42B5-8137-9DF3F51BA10A}">
+      <p15:sldGuideLst xmlns:p15="http://schemas.microsoft.com/office/powerpoint/2012/main"/>
+    </p:ext>
+  </p:extLst>
 </p:presentation>
 </file>
 
@@ -256,7 +261,7 @@
           <a:p>
             <a:fld id="{40600ECB-1D7A-484F-B0EF-DEF44051EA9A}" type="datetimeFigureOut">
               <a:rPr lang="en-SG" smtClean="0"/>
-              <a:t>10/6/2024</a:t>
+              <a:t>11/6/2024</a:t>
             </a:fld>
             <a:endParaRPr lang="en-SG"/>
           </a:p>
@@ -456,7 +461,7 @@
           <a:p>
             <a:fld id="{40600ECB-1D7A-484F-B0EF-DEF44051EA9A}" type="datetimeFigureOut">
               <a:rPr lang="en-SG" smtClean="0"/>
-              <a:t>10/6/2024</a:t>
+              <a:t>11/6/2024</a:t>
             </a:fld>
             <a:endParaRPr lang="en-SG"/>
           </a:p>
@@ -666,7 +671,7 @@
           <a:p>
             <a:fld id="{40600ECB-1D7A-484F-B0EF-DEF44051EA9A}" type="datetimeFigureOut">
               <a:rPr lang="en-SG" smtClean="0"/>
-              <a:t>10/6/2024</a:t>
+              <a:t>11/6/2024</a:t>
             </a:fld>
             <a:endParaRPr lang="en-SG"/>
           </a:p>
@@ -866,7 +871,7 @@
           <a:p>
             <a:fld id="{40600ECB-1D7A-484F-B0EF-DEF44051EA9A}" type="datetimeFigureOut">
               <a:rPr lang="en-SG" smtClean="0"/>
-              <a:t>10/6/2024</a:t>
+              <a:t>11/6/2024</a:t>
             </a:fld>
             <a:endParaRPr lang="en-SG"/>
           </a:p>
@@ -1142,7 +1147,7 @@
           <a:p>
             <a:fld id="{40600ECB-1D7A-484F-B0EF-DEF44051EA9A}" type="datetimeFigureOut">
               <a:rPr lang="en-SG" smtClean="0"/>
-              <a:t>10/6/2024</a:t>
+              <a:t>11/6/2024</a:t>
             </a:fld>
             <a:endParaRPr lang="en-SG"/>
           </a:p>
@@ -1410,7 +1415,7 @@
           <a:p>
             <a:fld id="{40600ECB-1D7A-484F-B0EF-DEF44051EA9A}" type="datetimeFigureOut">
               <a:rPr lang="en-SG" smtClean="0"/>
-              <a:t>10/6/2024</a:t>
+              <a:t>11/6/2024</a:t>
             </a:fld>
             <a:endParaRPr lang="en-SG"/>
           </a:p>
@@ -1825,7 +1830,7 @@
           <a:p>
             <a:fld id="{40600ECB-1D7A-484F-B0EF-DEF44051EA9A}" type="datetimeFigureOut">
               <a:rPr lang="en-SG" smtClean="0"/>
-              <a:t>10/6/2024</a:t>
+              <a:t>11/6/2024</a:t>
             </a:fld>
             <a:endParaRPr lang="en-SG"/>
           </a:p>
@@ -1967,7 +1972,7 @@
           <a:p>
             <a:fld id="{40600ECB-1D7A-484F-B0EF-DEF44051EA9A}" type="datetimeFigureOut">
               <a:rPr lang="en-SG" smtClean="0"/>
-              <a:t>10/6/2024</a:t>
+              <a:t>11/6/2024</a:t>
             </a:fld>
             <a:endParaRPr lang="en-SG"/>
           </a:p>
@@ -2080,7 +2085,7 @@
           <a:p>
             <a:fld id="{40600ECB-1D7A-484F-B0EF-DEF44051EA9A}" type="datetimeFigureOut">
               <a:rPr lang="en-SG" smtClean="0"/>
-              <a:t>10/6/2024</a:t>
+              <a:t>11/6/2024</a:t>
             </a:fld>
             <a:endParaRPr lang="en-SG"/>
           </a:p>
@@ -2393,7 +2398,7 @@
           <a:p>
             <a:fld id="{40600ECB-1D7A-484F-B0EF-DEF44051EA9A}" type="datetimeFigureOut">
               <a:rPr lang="en-SG" smtClean="0"/>
-              <a:t>10/6/2024</a:t>
+              <a:t>11/6/2024</a:t>
             </a:fld>
             <a:endParaRPr lang="en-SG"/>
           </a:p>
@@ -2682,7 +2687,7 @@
           <a:p>
             <a:fld id="{40600ECB-1D7A-484F-B0EF-DEF44051EA9A}" type="datetimeFigureOut">
               <a:rPr lang="en-SG" smtClean="0"/>
-              <a:t>10/6/2024</a:t>
+              <a:t>11/6/2024</a:t>
             </a:fld>
             <a:endParaRPr lang="en-SG"/>
           </a:p>
@@ -2925,7 +2930,7 @@
           <a:p>
             <a:fld id="{40600ECB-1D7A-484F-B0EF-DEF44051EA9A}" type="datetimeFigureOut">
               <a:rPr lang="en-SG" smtClean="0"/>
-              <a:t>10/6/2024</a:t>
+              <a:t>11/6/2024</a:t>
             </a:fld>
             <a:endParaRPr lang="en-SG"/>
           </a:p>
@@ -3342,56 +3347,6 @@
           <a:chExt cx="0" cy="0"/>
         </a:xfrm>
       </p:grpSpPr>
-      <p:sp>
-        <p:nvSpPr>
-          <p:cNvPr id="2" name="Title 1">
-            <a:extLst>
-              <a:ext uri="{FF2B5EF4-FFF2-40B4-BE49-F238E27FC236}">
-                <a16:creationId xmlns:a16="http://schemas.microsoft.com/office/drawing/2014/main" id="{2879D3F7-6FE3-59E3-7D66-2A8F23A28643}"/>
-              </a:ext>
-            </a:extLst>
-          </p:cNvPr>
-          <p:cNvSpPr>
-            <a:spLocks noGrp="1"/>
-          </p:cNvSpPr>
-          <p:nvPr>
-            <p:ph type="ctrTitle"/>
-          </p:nvPr>
-        </p:nvSpPr>
-        <p:spPr/>
-        <p:txBody>
-          <a:bodyPr/>
-          <a:lstStyle/>
-          <a:p>
-            <a:endParaRPr lang="en-SG"/>
-          </a:p>
-        </p:txBody>
-      </p:sp>
-      <p:sp>
-        <p:nvSpPr>
-          <p:cNvPr id="3" name="Subtitle 2">
-            <a:extLst>
-              <a:ext uri="{FF2B5EF4-FFF2-40B4-BE49-F238E27FC236}">
-                <a16:creationId xmlns:a16="http://schemas.microsoft.com/office/drawing/2014/main" id="{B625DB4B-1D42-DF1B-99DC-21353D999FC5}"/>
-              </a:ext>
-            </a:extLst>
-          </p:cNvPr>
-          <p:cNvSpPr>
-            <a:spLocks noGrp="1"/>
-          </p:cNvSpPr>
-          <p:nvPr>
-            <p:ph type="subTitle" idx="1"/>
-          </p:nvPr>
-        </p:nvSpPr>
-        <p:spPr/>
-        <p:txBody>
-          <a:bodyPr/>
-          <a:lstStyle/>
-          <a:p>
-            <a:endParaRPr lang="en-SG"/>
-          </a:p>
-        </p:txBody>
-      </p:sp>
     </p:spTree>
     <p:extLst>
       <p:ext uri="{BB962C8B-B14F-4D97-AF65-F5344CB8AC3E}">

</xml_diff>

<commit_message>
Update the chart page.
</commit_message>
<xml_diff>
--- a/doc/designDoc.pptx
+++ b/doc/designDoc.pptx
@@ -261,7 +261,7 @@
           <a:p>
             <a:fld id="{40600ECB-1D7A-484F-B0EF-DEF44051EA9A}" type="datetimeFigureOut">
               <a:rPr lang="en-SG" smtClean="0"/>
-              <a:t>11/6/2024</a:t>
+              <a:t>12/6/2024</a:t>
             </a:fld>
             <a:endParaRPr lang="en-SG"/>
           </a:p>
@@ -461,7 +461,7 @@
           <a:p>
             <a:fld id="{40600ECB-1D7A-484F-B0EF-DEF44051EA9A}" type="datetimeFigureOut">
               <a:rPr lang="en-SG" smtClean="0"/>
-              <a:t>11/6/2024</a:t>
+              <a:t>12/6/2024</a:t>
             </a:fld>
             <a:endParaRPr lang="en-SG"/>
           </a:p>
@@ -671,7 +671,7 @@
           <a:p>
             <a:fld id="{40600ECB-1D7A-484F-B0EF-DEF44051EA9A}" type="datetimeFigureOut">
               <a:rPr lang="en-SG" smtClean="0"/>
-              <a:t>11/6/2024</a:t>
+              <a:t>12/6/2024</a:t>
             </a:fld>
             <a:endParaRPr lang="en-SG"/>
           </a:p>
@@ -871,7 +871,7 @@
           <a:p>
             <a:fld id="{40600ECB-1D7A-484F-B0EF-DEF44051EA9A}" type="datetimeFigureOut">
               <a:rPr lang="en-SG" smtClean="0"/>
-              <a:t>11/6/2024</a:t>
+              <a:t>12/6/2024</a:t>
             </a:fld>
             <a:endParaRPr lang="en-SG"/>
           </a:p>
@@ -1147,7 +1147,7 @@
           <a:p>
             <a:fld id="{40600ECB-1D7A-484F-B0EF-DEF44051EA9A}" type="datetimeFigureOut">
               <a:rPr lang="en-SG" smtClean="0"/>
-              <a:t>11/6/2024</a:t>
+              <a:t>12/6/2024</a:t>
             </a:fld>
             <a:endParaRPr lang="en-SG"/>
           </a:p>
@@ -1415,7 +1415,7 @@
           <a:p>
             <a:fld id="{40600ECB-1D7A-484F-B0EF-DEF44051EA9A}" type="datetimeFigureOut">
               <a:rPr lang="en-SG" smtClean="0"/>
-              <a:t>11/6/2024</a:t>
+              <a:t>12/6/2024</a:t>
             </a:fld>
             <a:endParaRPr lang="en-SG"/>
           </a:p>
@@ -1830,7 +1830,7 @@
           <a:p>
             <a:fld id="{40600ECB-1D7A-484F-B0EF-DEF44051EA9A}" type="datetimeFigureOut">
               <a:rPr lang="en-SG" smtClean="0"/>
-              <a:t>11/6/2024</a:t>
+              <a:t>12/6/2024</a:t>
             </a:fld>
             <a:endParaRPr lang="en-SG"/>
           </a:p>
@@ -1972,7 +1972,7 @@
           <a:p>
             <a:fld id="{40600ECB-1D7A-484F-B0EF-DEF44051EA9A}" type="datetimeFigureOut">
               <a:rPr lang="en-SG" smtClean="0"/>
-              <a:t>11/6/2024</a:t>
+              <a:t>12/6/2024</a:t>
             </a:fld>
             <a:endParaRPr lang="en-SG"/>
           </a:p>
@@ -2085,7 +2085,7 @@
           <a:p>
             <a:fld id="{40600ECB-1D7A-484F-B0EF-DEF44051EA9A}" type="datetimeFigureOut">
               <a:rPr lang="en-SG" smtClean="0"/>
-              <a:t>11/6/2024</a:t>
+              <a:t>12/6/2024</a:t>
             </a:fld>
             <a:endParaRPr lang="en-SG"/>
           </a:p>
@@ -2398,7 +2398,7 @@
           <a:p>
             <a:fld id="{40600ECB-1D7A-484F-B0EF-DEF44051EA9A}" type="datetimeFigureOut">
               <a:rPr lang="en-SG" smtClean="0"/>
-              <a:t>11/6/2024</a:t>
+              <a:t>12/6/2024</a:t>
             </a:fld>
             <a:endParaRPr lang="en-SG"/>
           </a:p>
@@ -2687,7 +2687,7 @@
           <a:p>
             <a:fld id="{40600ECB-1D7A-484F-B0EF-DEF44051EA9A}" type="datetimeFigureOut">
               <a:rPr lang="en-SG" smtClean="0"/>
-              <a:t>11/6/2024</a:t>
+              <a:t>12/6/2024</a:t>
             </a:fld>
             <a:endParaRPr lang="en-SG"/>
           </a:p>
@@ -2930,7 +2930,7 @@
           <a:p>
             <a:fld id="{40600ECB-1D7A-484F-B0EF-DEF44051EA9A}" type="datetimeFigureOut">
               <a:rPr lang="en-SG" smtClean="0"/>
-              <a:t>11/6/2024</a:t>
+              <a:t>12/6/2024</a:t>
             </a:fld>
             <a:endParaRPr lang="en-SG"/>
           </a:p>
@@ -3347,6 +3347,191 @@
           <a:chExt cx="0" cy="0"/>
         </a:xfrm>
       </p:grpSpPr>
+      <p:pic>
+        <p:nvPicPr>
+          <p:cNvPr id="1026" name="Picture 2" descr="Raspberry Pi Logo PNG Transparent Logo - Freepngdesign.com">
+            <a:extLst>
+              <a:ext uri="{FF2B5EF4-FFF2-40B4-BE49-F238E27FC236}">
+                <a16:creationId xmlns:a16="http://schemas.microsoft.com/office/drawing/2014/main" id="{F94A7A97-50B7-B7EB-EB8E-8C63F4D2602E}"/>
+              </a:ext>
+            </a:extLst>
+          </p:cNvPr>
+          <p:cNvPicPr>
+            <a:picLocks noChangeAspect="1" noChangeArrowheads="1"/>
+          </p:cNvPicPr>
+          <p:nvPr/>
+        </p:nvPicPr>
+        <p:blipFill>
+          <a:blip r:embed="rId2">
+            <a:extLst>
+              <a:ext uri="{28A0092B-C50C-407E-A947-70E740481C1C}">
+                <a14:useLocalDpi xmlns:a14="http://schemas.microsoft.com/office/drawing/2010/main" val="0"/>
+              </a:ext>
+            </a:extLst>
+          </a:blip>
+          <a:srcRect/>
+          <a:stretch>
+            <a:fillRect/>
+          </a:stretch>
+        </p:blipFill>
+        <p:spPr bwMode="auto">
+          <a:xfrm>
+            <a:off x="3152585" y="1727835"/>
+            <a:ext cx="2466975" cy="1847850"/>
+          </a:xfrm>
+          <a:prstGeom prst="rect">
+            <a:avLst/>
+          </a:prstGeom>
+          <a:noFill/>
+          <a:extLst>
+            <a:ext uri="{909E8E84-426E-40DD-AFC4-6F175D3DCCD1}">
+              <a14:hiddenFill xmlns:a14="http://schemas.microsoft.com/office/drawing/2010/main">
+                <a:solidFill>
+                  <a:srgbClr val="FFFFFF"/>
+                </a:solidFill>
+              </a14:hiddenFill>
+            </a:ext>
+          </a:extLst>
+        </p:spPr>
+      </p:pic>
+      <p:pic>
+        <p:nvPicPr>
+          <p:cNvPr id="5" name="Picture 4">
+            <a:extLst>
+              <a:ext uri="{FF2B5EF4-FFF2-40B4-BE49-F238E27FC236}">
+                <a16:creationId xmlns:a16="http://schemas.microsoft.com/office/drawing/2014/main" id="{8C0C4FB6-FAAE-F99A-A7F8-E5C7FD7B955C}"/>
+              </a:ext>
+            </a:extLst>
+          </p:cNvPr>
+          <p:cNvPicPr>
+            <a:picLocks noChangeAspect="1"/>
+          </p:cNvPicPr>
+          <p:nvPr/>
+        </p:nvPicPr>
+        <p:blipFill>
+          <a:blip r:embed="rId3"/>
+          <a:stretch>
+            <a:fillRect/>
+          </a:stretch>
+        </p:blipFill>
+        <p:spPr>
+          <a:xfrm>
+            <a:off x="8083564" y="3575685"/>
+            <a:ext cx="809524" cy="742857"/>
+          </a:xfrm>
+          <a:prstGeom prst="rect">
+            <a:avLst/>
+          </a:prstGeom>
+        </p:spPr>
+      </p:pic>
+      <p:pic>
+        <p:nvPicPr>
+          <p:cNvPr id="9" name="Picture 8" descr="A white symbol in a circle&#10;&#10;Description automatically generated">
+            <a:extLst>
+              <a:ext uri="{FF2B5EF4-FFF2-40B4-BE49-F238E27FC236}">
+                <a16:creationId xmlns:a16="http://schemas.microsoft.com/office/drawing/2014/main" id="{936D72CF-70A9-5925-F0E3-9D764E54AAF9}"/>
+              </a:ext>
+            </a:extLst>
+          </p:cNvPr>
+          <p:cNvPicPr>
+            <a:picLocks noChangeAspect="1"/>
+          </p:cNvPicPr>
+          <p:nvPr/>
+        </p:nvPicPr>
+        <p:blipFill>
+          <a:blip r:embed="rId4">
+            <a:extLst>
+              <a:ext uri="{28A0092B-C50C-407E-A947-70E740481C1C}">
+                <a14:useLocalDpi xmlns:a14="http://schemas.microsoft.com/office/drawing/2010/main" val="0"/>
+              </a:ext>
+            </a:extLst>
+          </a:blip>
+          <a:stretch>
+            <a:fillRect/>
+          </a:stretch>
+        </p:blipFill>
+        <p:spPr>
+          <a:xfrm>
+            <a:off x="3955936" y="2372784"/>
+            <a:ext cx="855613" cy="880779"/>
+          </a:xfrm>
+          <a:prstGeom prst="rect">
+            <a:avLst/>
+          </a:prstGeom>
+        </p:spPr>
+      </p:pic>
+      <p:sp>
+        <p:nvSpPr>
+          <p:cNvPr id="10" name="TextBox 9">
+            <a:extLst>
+              <a:ext uri="{FF2B5EF4-FFF2-40B4-BE49-F238E27FC236}">
+                <a16:creationId xmlns:a16="http://schemas.microsoft.com/office/drawing/2014/main" id="{9D371F64-8A0B-4FC5-F82A-171B9CE7B0D3}"/>
+              </a:ext>
+            </a:extLst>
+          </p:cNvPr>
+          <p:cNvSpPr txBox="1"/>
+          <p:nvPr/>
+        </p:nvSpPr>
+        <p:spPr>
+          <a:xfrm>
+            <a:off x="3222352" y="2062716"/>
+            <a:ext cx="329609" cy="1569660"/>
+          </a:xfrm>
+          <a:prstGeom prst="rect">
+            <a:avLst/>
+          </a:prstGeom>
+          <a:noFill/>
+        </p:spPr>
+        <p:txBody>
+          <a:bodyPr wrap="square" rtlCol="0">
+            <a:spAutoFit/>
+          </a:bodyPr>
+          <a:lstStyle/>
+          <a:p>
+            <a:r>
+              <a:rPr lang="en-US" sz="9600" dirty="0"/>
+              <a:t>I</a:t>
+            </a:r>
+            <a:endParaRPr lang="en-SG" sz="9600" dirty="0"/>
+          </a:p>
+        </p:txBody>
+      </p:sp>
+      <p:sp>
+        <p:nvSpPr>
+          <p:cNvPr id="11" name="TextBox 10">
+            <a:extLst>
+              <a:ext uri="{FF2B5EF4-FFF2-40B4-BE49-F238E27FC236}">
+                <a16:creationId xmlns:a16="http://schemas.microsoft.com/office/drawing/2014/main" id="{93412A33-2BF0-62F5-632E-0A7047613B43}"/>
+              </a:ext>
+            </a:extLst>
+          </p:cNvPr>
+          <p:cNvSpPr txBox="1"/>
+          <p:nvPr/>
+        </p:nvSpPr>
+        <p:spPr>
+          <a:xfrm>
+            <a:off x="4885945" y="2028343"/>
+            <a:ext cx="329609" cy="1569660"/>
+          </a:xfrm>
+          <a:prstGeom prst="rect">
+            <a:avLst/>
+          </a:prstGeom>
+          <a:noFill/>
+        </p:spPr>
+        <p:txBody>
+          <a:bodyPr wrap="square" rtlCol="0">
+            <a:spAutoFit/>
+          </a:bodyPr>
+          <a:lstStyle/>
+          <a:p>
+            <a:r>
+              <a:rPr lang="en-US" sz="9600" dirty="0"/>
+              <a:t>T</a:t>
+            </a:r>
+            <a:endParaRPr lang="en-SG" sz="9600" dirty="0"/>
+          </a:p>
+        </p:txBody>
+      </p:sp>
     </p:spTree>
     <p:extLst>
       <p:ext uri="{BB962C8B-B14F-4D97-AF65-F5344CB8AC3E}">

</xml_diff>

<commit_message>
clear the old images and update the read me program usage section.
</commit_message>
<xml_diff>
--- a/doc/designDoc.pptx
+++ b/doc/designDoc.pptx
@@ -5968,6 +5968,129 @@
               <a:t>Network or Wi-Fi</a:t>
             </a:r>
             <a:endParaRPr lang="en-SG" sz="1100" b="1" dirty="0"/>
+          </a:p>
+        </p:txBody>
+      </p:sp>
+      <p:pic>
+        <p:nvPicPr>
+          <p:cNvPr id="34" name="Picture 33" descr="A screenshot of a computer&#10;&#10;Description automatically generated">
+            <a:extLst>
+              <a:ext uri="{FF2B5EF4-FFF2-40B4-BE49-F238E27FC236}">
+                <a16:creationId xmlns:a16="http://schemas.microsoft.com/office/drawing/2014/main" id="{32428691-1FCD-8B50-454D-E73DB901D90D}"/>
+              </a:ext>
+            </a:extLst>
+          </p:cNvPr>
+          <p:cNvPicPr>
+            <a:picLocks noChangeAspect="1"/>
+          </p:cNvPicPr>
+          <p:nvPr/>
+        </p:nvPicPr>
+        <p:blipFill>
+          <a:blip r:embed="rId6">
+            <a:extLst>
+              <a:ext uri="{28A0092B-C50C-407E-A947-70E740481C1C}">
+                <a14:useLocalDpi xmlns:a14="http://schemas.microsoft.com/office/drawing/2010/main" val="0"/>
+              </a:ext>
+            </a:extLst>
+          </a:blip>
+          <a:stretch>
+            <a:fillRect/>
+          </a:stretch>
+        </p:blipFill>
+        <p:spPr>
+          <a:xfrm>
+            <a:off x="4158357" y="1022710"/>
+            <a:ext cx="6841970" cy="2166744"/>
+          </a:xfrm>
+          <a:prstGeom prst="rect">
+            <a:avLst/>
+          </a:prstGeom>
+        </p:spPr>
+      </p:pic>
+      <p:pic>
+        <p:nvPicPr>
+          <p:cNvPr id="32" name="Picture 31" descr="A raspberry with a logo&#10;&#10;Description automatically generated">
+            <a:extLst>
+              <a:ext uri="{FF2B5EF4-FFF2-40B4-BE49-F238E27FC236}">
+                <a16:creationId xmlns:a16="http://schemas.microsoft.com/office/drawing/2014/main" id="{74AE6E64-7E39-4BE3-1A8B-1C62A632BE1A}"/>
+              </a:ext>
+            </a:extLst>
+          </p:cNvPr>
+          <p:cNvPicPr>
+            <a:picLocks noChangeAspect="1"/>
+          </p:cNvPicPr>
+          <p:nvPr/>
+        </p:nvPicPr>
+        <p:blipFill>
+          <a:blip r:embed="rId7">
+            <a:extLst>
+              <a:ext uri="{28A0092B-C50C-407E-A947-70E740481C1C}">
+                <a14:useLocalDpi xmlns:a14="http://schemas.microsoft.com/office/drawing/2010/main" val="0"/>
+              </a:ext>
+            </a:extLst>
+          </a:blip>
+          <a:stretch>
+            <a:fillRect/>
+          </a:stretch>
+        </p:blipFill>
+        <p:spPr>
+          <a:xfrm>
+            <a:off x="2046383" y="1088135"/>
+            <a:ext cx="2111974" cy="2015537"/>
+          </a:xfrm>
+          <a:prstGeom prst="rect">
+            <a:avLst/>
+          </a:prstGeom>
+          <a:ln w="6350">
+            <a:solidFill>
+              <a:schemeClr val="tx1"/>
+            </a:solidFill>
+          </a:ln>
+        </p:spPr>
+      </p:pic>
+      <p:sp>
+        <p:nvSpPr>
+          <p:cNvPr id="35" name="Rectangle 34">
+            <a:extLst>
+              <a:ext uri="{FF2B5EF4-FFF2-40B4-BE49-F238E27FC236}">
+                <a16:creationId xmlns:a16="http://schemas.microsoft.com/office/drawing/2014/main" id="{74F552DC-09D0-6F54-9BDB-BC37F43ED5D2}"/>
+              </a:ext>
+            </a:extLst>
+          </p:cNvPr>
+          <p:cNvSpPr/>
+          <p:nvPr/>
+        </p:nvSpPr>
+        <p:spPr>
+          <a:xfrm>
+            <a:off x="8074153" y="1115568"/>
+            <a:ext cx="100584" cy="109728"/>
+          </a:xfrm>
+          <a:prstGeom prst="rect">
+            <a:avLst/>
+          </a:prstGeom>
+        </p:spPr>
+        <p:style>
+          <a:lnRef idx="2">
+            <a:schemeClr val="accent1">
+              <a:shade val="15000"/>
+            </a:schemeClr>
+          </a:lnRef>
+          <a:fillRef idx="1">
+            <a:schemeClr val="accent1"/>
+          </a:fillRef>
+          <a:effectRef idx="0">
+            <a:schemeClr val="accent1"/>
+          </a:effectRef>
+          <a:fontRef idx="minor">
+            <a:schemeClr val="lt1"/>
+          </a:fontRef>
+        </p:style>
+        <p:txBody>
+          <a:bodyPr rtlCol="0" anchor="ctr"/>
+          <a:lstStyle/>
+          <a:p>
+            <a:pPr algn="ctr"/>
+            <a:endParaRPr lang="en-SG"/>
           </a:p>
         </p:txBody>
       </p:sp>

</xml_diff>

<commit_message>
update the design document and read me table of contents.
</commit_message>
<xml_diff>
--- a/doc/designDoc.pptx
+++ b/doc/designDoc.pptx
@@ -7,6 +7,7 @@
   <p:sldIdLst>
     <p:sldId id="256" r:id="rId2"/>
     <p:sldId id="257" r:id="rId3"/>
+    <p:sldId id="258" r:id="rId4"/>
   </p:sldIdLst>
   <p:sldSz cx="12192000" cy="6858000"/>
   <p:notesSz cx="6858000" cy="9144000"/>
@@ -6107,6 +6108,210 @@
 </p:sld>
 </file>
 
+<file path=ppt/slides/slide3.xml><?xml version="1.0" encoding="utf-8"?>
+<p:sld xmlns:a="http://schemas.openxmlformats.org/drawingml/2006/main" xmlns:r="http://schemas.openxmlformats.org/officeDocument/2006/relationships" xmlns:p="http://schemas.openxmlformats.org/presentationml/2006/main">
+  <p:cSld>
+    <p:spTree>
+      <p:nvGrpSpPr>
+        <p:cNvPr id="1" name=""/>
+        <p:cNvGrpSpPr/>
+        <p:nvPr/>
+      </p:nvGrpSpPr>
+      <p:grpSpPr>
+        <a:xfrm>
+          <a:off x="0" y="0"/>
+          <a:ext cx="0" cy="0"/>
+          <a:chOff x="0" y="0"/>
+          <a:chExt cx="0" cy="0"/>
+        </a:xfrm>
+      </p:grpSpPr>
+      <p:sp>
+        <p:nvSpPr>
+          <p:cNvPr id="9" name="Rectangle 8">
+            <a:extLst>
+              <a:ext uri="{FF2B5EF4-FFF2-40B4-BE49-F238E27FC236}">
+                <a16:creationId xmlns:a16="http://schemas.microsoft.com/office/drawing/2014/main" id="{7F71B48F-1049-C4C9-FED0-E0406ACD3515}"/>
+              </a:ext>
+            </a:extLst>
+          </p:cNvPr>
+          <p:cNvSpPr/>
+          <p:nvPr/>
+        </p:nvSpPr>
+        <p:spPr>
+          <a:xfrm>
+            <a:off x="1554480" y="1041695"/>
+            <a:ext cx="8229600" cy="4929337"/>
+          </a:xfrm>
+          <a:prstGeom prst="rect">
+            <a:avLst/>
+          </a:prstGeom>
+          <a:noFill/>
+          <a:ln>
+            <a:prstDash val="sysDash"/>
+          </a:ln>
+        </p:spPr>
+        <p:style>
+          <a:lnRef idx="2">
+            <a:schemeClr val="accent1">
+              <a:shade val="15000"/>
+            </a:schemeClr>
+          </a:lnRef>
+          <a:fillRef idx="1">
+            <a:schemeClr val="accent1"/>
+          </a:fillRef>
+          <a:effectRef idx="0">
+            <a:schemeClr val="accent1"/>
+          </a:effectRef>
+          <a:fontRef idx="minor">
+            <a:schemeClr val="lt1"/>
+          </a:fontRef>
+        </p:style>
+        <p:txBody>
+          <a:bodyPr rtlCol="0" anchor="ctr"/>
+          <a:lstStyle/>
+          <a:p>
+            <a:pPr algn="ctr"/>
+            <a:endParaRPr lang="en-SG" dirty="0"/>
+          </a:p>
+        </p:txBody>
+      </p:sp>
+      <p:pic>
+        <p:nvPicPr>
+          <p:cNvPr id="7" name="Picture 6" descr="A diagram of a computer system&#10;&#10;Description automatically generated">
+            <a:extLst>
+              <a:ext uri="{FF2B5EF4-FFF2-40B4-BE49-F238E27FC236}">
+                <a16:creationId xmlns:a16="http://schemas.microsoft.com/office/drawing/2014/main" id="{5551DCD5-27A1-EAEC-7473-75547DE2C6EB}"/>
+              </a:ext>
+            </a:extLst>
+          </p:cNvPr>
+          <p:cNvPicPr>
+            <a:picLocks noChangeAspect="1"/>
+          </p:cNvPicPr>
+          <p:nvPr/>
+        </p:nvPicPr>
+        <p:blipFill>
+          <a:blip r:embed="rId2">
+            <a:extLst>
+              <a:ext uri="{28A0092B-C50C-407E-A947-70E740481C1C}">
+                <a14:useLocalDpi xmlns:a14="http://schemas.microsoft.com/office/drawing/2010/main" val="0"/>
+              </a:ext>
+            </a:extLst>
+          </a:blip>
+          <a:stretch>
+            <a:fillRect/>
+          </a:stretch>
+        </p:blipFill>
+        <p:spPr>
+          <a:xfrm>
+            <a:off x="1765268" y="3201425"/>
+            <a:ext cx="7899940" cy="2614880"/>
+          </a:xfrm>
+          <a:prstGeom prst="rect">
+            <a:avLst/>
+          </a:prstGeom>
+        </p:spPr>
+      </p:pic>
+      <p:pic>
+        <p:nvPicPr>
+          <p:cNvPr id="5" name="Picture 4" descr="A diagram of a room with people in it&#10;&#10;Description automatically generated">
+            <a:extLst>
+              <a:ext uri="{FF2B5EF4-FFF2-40B4-BE49-F238E27FC236}">
+                <a16:creationId xmlns:a16="http://schemas.microsoft.com/office/drawing/2014/main" id="{3EF2320D-A084-9E74-C79C-12B88546A1E7}"/>
+              </a:ext>
+            </a:extLst>
+          </p:cNvPr>
+          <p:cNvPicPr>
+            <a:picLocks noChangeAspect="1"/>
+          </p:cNvPicPr>
+          <p:nvPr/>
+        </p:nvPicPr>
+        <p:blipFill>
+          <a:blip r:embed="rId3">
+            <a:extLst>
+              <a:ext uri="{28A0092B-C50C-407E-A947-70E740481C1C}">
+                <a14:useLocalDpi xmlns:a14="http://schemas.microsoft.com/office/drawing/2010/main" val="0"/>
+              </a:ext>
+            </a:extLst>
+          </a:blip>
+          <a:stretch>
+            <a:fillRect/>
+          </a:stretch>
+        </p:blipFill>
+        <p:spPr>
+          <a:xfrm>
+            <a:off x="1829276" y="1718047"/>
+            <a:ext cx="7619048" cy="1885714"/>
+          </a:xfrm>
+          <a:prstGeom prst="rect">
+            <a:avLst/>
+          </a:prstGeom>
+        </p:spPr>
+      </p:pic>
+      <p:sp>
+        <p:nvSpPr>
+          <p:cNvPr id="8" name="TextBox 7">
+            <a:extLst>
+              <a:ext uri="{FF2B5EF4-FFF2-40B4-BE49-F238E27FC236}">
+                <a16:creationId xmlns:a16="http://schemas.microsoft.com/office/drawing/2014/main" id="{14C82E35-9247-0CDA-D05E-778E83354630}"/>
+              </a:ext>
+            </a:extLst>
+          </p:cNvPr>
+          <p:cNvSpPr txBox="1"/>
+          <p:nvPr/>
+        </p:nvSpPr>
+        <p:spPr>
+          <a:xfrm>
+            <a:off x="1829276" y="1263659"/>
+            <a:ext cx="5617857" cy="369332"/>
+          </a:xfrm>
+          <a:prstGeom prst="rect">
+            <a:avLst/>
+          </a:prstGeom>
+          <a:noFill/>
+        </p:spPr>
+        <p:txBody>
+          <a:bodyPr wrap="square" rtlCol="0">
+            <a:spAutoFit/>
+          </a:bodyPr>
+          <a:lstStyle/>
+          <a:p>
+            <a:r>
+              <a:rPr lang="en-US" b="1" dirty="0"/>
+              <a:t>Raspberry PI </a:t>
+            </a:r>
+            <a:r>
+              <a:rPr lang="en-US" b="1" dirty="0" err="1"/>
+              <a:t>Xandar</a:t>
+            </a:r>
+            <a:r>
+              <a:rPr lang="en-US" b="1" dirty="0"/>
+              <a:t> </a:t>
+            </a:r>
+            <a:r>
+              <a:rPr lang="en-US" b="1" dirty="0" err="1"/>
+              <a:t>Kardian</a:t>
+            </a:r>
+            <a:r>
+              <a:rPr lang="en-US" b="1" dirty="0"/>
+              <a:t> IoT People Count Radar</a:t>
+            </a:r>
+            <a:endParaRPr lang="en-SG" b="1" dirty="0"/>
+          </a:p>
+        </p:txBody>
+      </p:sp>
+    </p:spTree>
+    <p:extLst>
+      <p:ext uri="{BB962C8B-B14F-4D97-AF65-F5344CB8AC3E}">
+        <p14:creationId xmlns:p14="http://schemas.microsoft.com/office/powerpoint/2010/main" val="1448706094"/>
+      </p:ext>
+    </p:extLst>
+  </p:cSld>
+  <p:clrMapOvr>
+    <a:masterClrMapping/>
+  </p:clrMapOvr>
+</p:sld>
+</file>
+
 <file path=ppt/theme/theme1.xml><?xml version="1.0" encoding="utf-8"?>
 <a:theme xmlns:a="http://schemas.openxmlformats.org/drawingml/2006/main" name="Office Theme">
   <a:themeElements>

</xml_diff>